<commit_message>
Updated a reading guide
</commit_message>
<xml_diff>
--- a/modules/MgmntCWH/READING_Christensenetal_1996.pptx
+++ b/modules/MgmntCWH/READING_Christensenetal_1996.pptx
@@ -217,7 +217,7 @@
           <a:p>
             <a:fld id="{EF599A65-391F-4EB8-9242-B59EE92B5FB9}" type="datetimeFigureOut">
               <a:rPr lang="en-US" smtClean="0"/>
-              <a:t>4/2/2016</a:t>
+              <a:t>4/6/2016</a:t>
             </a:fld>
             <a:endParaRPr lang="en-US"/>
           </a:p>
@@ -616,7 +616,7 @@
           <a:p>
             <a:fld id="{07A46C8F-DB9C-4B91-A1F1-A860256637FA}" type="datetimeFigureOut">
               <a:rPr lang="en-US" smtClean="0"/>
-              <a:t>4/2/2016</a:t>
+              <a:t>4/6/2016</a:t>
             </a:fld>
             <a:endParaRPr lang="en-US"/>
           </a:p>
@@ -786,7 +786,7 @@
           <a:p>
             <a:fld id="{07A46C8F-DB9C-4B91-A1F1-A860256637FA}" type="datetimeFigureOut">
               <a:rPr lang="en-US" smtClean="0"/>
-              <a:t>4/2/2016</a:t>
+              <a:t>4/6/2016</a:t>
             </a:fld>
             <a:endParaRPr lang="en-US"/>
           </a:p>
@@ -966,7 +966,7 @@
           <a:p>
             <a:fld id="{07A46C8F-DB9C-4B91-A1F1-A860256637FA}" type="datetimeFigureOut">
               <a:rPr lang="en-US" smtClean="0"/>
-              <a:t>4/2/2016</a:t>
+              <a:t>4/6/2016</a:t>
             </a:fld>
             <a:endParaRPr lang="en-US"/>
           </a:p>
@@ -1136,7 +1136,7 @@
           <a:p>
             <a:fld id="{07A46C8F-DB9C-4B91-A1F1-A860256637FA}" type="datetimeFigureOut">
               <a:rPr lang="en-US" smtClean="0"/>
-              <a:t>4/2/2016</a:t>
+              <a:t>4/6/2016</a:t>
             </a:fld>
             <a:endParaRPr lang="en-US"/>
           </a:p>
@@ -1380,7 +1380,7 @@
           <a:p>
             <a:fld id="{07A46C8F-DB9C-4B91-A1F1-A860256637FA}" type="datetimeFigureOut">
               <a:rPr lang="en-US" smtClean="0"/>
-              <a:t>4/2/2016</a:t>
+              <a:t>4/6/2016</a:t>
             </a:fld>
             <a:endParaRPr lang="en-US"/>
           </a:p>
@@ -1612,7 +1612,7 @@
           <a:p>
             <a:fld id="{07A46C8F-DB9C-4B91-A1F1-A860256637FA}" type="datetimeFigureOut">
               <a:rPr lang="en-US" smtClean="0"/>
-              <a:t>4/2/2016</a:t>
+              <a:t>4/6/2016</a:t>
             </a:fld>
             <a:endParaRPr lang="en-US"/>
           </a:p>
@@ -1979,7 +1979,7 @@
           <a:p>
             <a:fld id="{07A46C8F-DB9C-4B91-A1F1-A860256637FA}" type="datetimeFigureOut">
               <a:rPr lang="en-US" smtClean="0"/>
-              <a:t>4/2/2016</a:t>
+              <a:t>4/6/2016</a:t>
             </a:fld>
             <a:endParaRPr lang="en-US"/>
           </a:p>
@@ -2097,7 +2097,7 @@
           <a:p>
             <a:fld id="{07A46C8F-DB9C-4B91-A1F1-A860256637FA}" type="datetimeFigureOut">
               <a:rPr lang="en-US" smtClean="0"/>
-              <a:t>4/2/2016</a:t>
+              <a:t>4/6/2016</a:t>
             </a:fld>
             <a:endParaRPr lang="en-US"/>
           </a:p>
@@ -2192,7 +2192,7 @@
           <a:p>
             <a:fld id="{07A46C8F-DB9C-4B91-A1F1-A860256637FA}" type="datetimeFigureOut">
               <a:rPr lang="en-US" smtClean="0"/>
-              <a:t>4/2/2016</a:t>
+              <a:t>4/6/2016</a:t>
             </a:fld>
             <a:endParaRPr lang="en-US"/>
           </a:p>
@@ -2469,7 +2469,7 @@
           <a:p>
             <a:fld id="{07A46C8F-DB9C-4B91-A1F1-A860256637FA}" type="datetimeFigureOut">
               <a:rPr lang="en-US" smtClean="0"/>
-              <a:t>4/2/2016</a:t>
+              <a:t>4/6/2016</a:t>
             </a:fld>
             <a:endParaRPr lang="en-US"/>
           </a:p>
@@ -2726,7 +2726,7 @@
           <a:p>
             <a:fld id="{07A46C8F-DB9C-4B91-A1F1-A860256637FA}" type="datetimeFigureOut">
               <a:rPr lang="en-US" smtClean="0"/>
-              <a:t>4/2/2016</a:t>
+              <a:t>4/6/2016</a:t>
             </a:fld>
             <a:endParaRPr lang="en-US"/>
           </a:p>
@@ -2939,7 +2939,7 @@
           <a:p>
             <a:fld id="{07A46C8F-DB9C-4B91-A1F1-A860256637FA}" type="datetimeFigureOut">
               <a:rPr lang="en-US" smtClean="0"/>
-              <a:t>4/2/2016</a:t>
+              <a:t>4/6/2016</a:t>
             </a:fld>
             <a:endParaRPr lang="en-US"/>
           </a:p>
@@ -3381,19 +3381,7 @@
             </a:r>
             <a:r>
               <a:rPr lang="en-US" sz="3600" b="1" dirty="0" smtClean="0"/>
-              <a:t> </a:t>
-            </a:r>
-            <a:r>
-              <a:rPr lang="en-US" sz="3600" b="1" dirty="0" smtClean="0"/>
-              <a:t>(</a:t>
-            </a:r>
-            <a:r>
-              <a:rPr lang="en-US" sz="3600" b="1" dirty="0" smtClean="0"/>
-              <a:t>199</a:t>
-            </a:r>
-            <a:r>
-              <a:rPr lang="en-US" sz="3600" b="1" dirty="0" smtClean="0"/>
-              <a:t>6)</a:t>
+              <a:t> (1996)</a:t>
             </a:r>
             <a:r>
               <a:rPr lang="en-US" sz="3600" dirty="0" smtClean="0"/>
@@ -3411,15 +3399,7 @@
             </a:br>
             <a:r>
               <a:rPr lang="en-US" sz="3600" dirty="0" smtClean="0"/>
-              <a:t>Coarse Woody </a:t>
-            </a:r>
-            <a:r>
-              <a:rPr lang="en-US" sz="3600" dirty="0" smtClean="0"/>
-              <a:t>Debris and Lakeshore Development</a:t>
-            </a:r>
-            <a:r>
-              <a:rPr lang="en-US" sz="3600" dirty="0" smtClean="0"/>
-              <a:t/>
+              <a:t>Coarse Woody Debris and Lakeshore Development</a:t>
             </a:r>
             <a:br>
               <a:rPr lang="en-US" sz="3600" dirty="0" smtClean="0"/>
@@ -3691,7 +3671,6 @@
               <a:rPr lang="en-US" dirty="0" smtClean="0"/>
               <a:t>What factors determine the density of CWH in aquatic systems?</a:t>
             </a:r>
-            <a:endParaRPr lang="en-US" dirty="0" smtClean="0"/>
           </a:p>
         </p:txBody>
       </p:sp>
@@ -3972,6 +3951,146 @@
           </p:txBody>
         </p:sp>
       </p:grpSp>
+      <p:cxnSp>
+        <p:nvCxnSpPr>
+          <p:cNvPr id="8" name="Straight Connector 7"/>
+          <p:cNvCxnSpPr/>
+          <p:nvPr/>
+        </p:nvCxnSpPr>
+        <p:spPr>
+          <a:xfrm>
+            <a:off x="3503776" y="2713703"/>
+            <a:ext cx="4735656" cy="0"/>
+          </a:xfrm>
+          <a:prstGeom prst="line">
+            <a:avLst/>
+          </a:prstGeom>
+          <a:ln w="31750">
+            <a:solidFill>
+              <a:srgbClr val="FF0000"/>
+            </a:solidFill>
+          </a:ln>
+        </p:spPr>
+        <p:style>
+          <a:lnRef idx="1">
+            <a:schemeClr val="accent2"/>
+          </a:lnRef>
+          <a:fillRef idx="0">
+            <a:schemeClr val="accent2"/>
+          </a:fillRef>
+          <a:effectRef idx="0">
+            <a:schemeClr val="accent2"/>
+          </a:effectRef>
+          <a:fontRef idx="minor">
+            <a:schemeClr val="tx1"/>
+          </a:fontRef>
+        </p:style>
+      </p:cxnSp>
+      <p:cxnSp>
+        <p:nvCxnSpPr>
+          <p:cNvPr id="16" name="Straight Connector 15"/>
+          <p:cNvCxnSpPr/>
+          <p:nvPr/>
+        </p:nvCxnSpPr>
+        <p:spPr>
+          <a:xfrm flipV="1">
+            <a:off x="1192468" y="3079751"/>
+            <a:ext cx="7028444" cy="39464"/>
+          </a:xfrm>
+          <a:prstGeom prst="line">
+            <a:avLst/>
+          </a:prstGeom>
+          <a:ln w="31750">
+            <a:solidFill>
+              <a:srgbClr val="FF0000"/>
+            </a:solidFill>
+          </a:ln>
+        </p:spPr>
+        <p:style>
+          <a:lnRef idx="1">
+            <a:schemeClr val="accent2"/>
+          </a:lnRef>
+          <a:fillRef idx="0">
+            <a:schemeClr val="accent2"/>
+          </a:fillRef>
+          <a:effectRef idx="0">
+            <a:schemeClr val="accent2"/>
+          </a:effectRef>
+          <a:fontRef idx="minor">
+            <a:schemeClr val="tx1"/>
+          </a:fontRef>
+        </p:style>
+      </p:cxnSp>
+      <p:cxnSp>
+        <p:nvCxnSpPr>
+          <p:cNvPr id="17" name="Straight Connector 16"/>
+          <p:cNvCxnSpPr/>
+          <p:nvPr/>
+        </p:nvCxnSpPr>
+        <p:spPr>
+          <a:xfrm flipV="1">
+            <a:off x="1167917" y="3460955"/>
+            <a:ext cx="1600920" cy="1936"/>
+          </a:xfrm>
+          <a:prstGeom prst="line">
+            <a:avLst/>
+          </a:prstGeom>
+          <a:ln w="31750">
+            <a:solidFill>
+              <a:srgbClr val="FF0000"/>
+            </a:solidFill>
+          </a:ln>
+        </p:spPr>
+        <p:style>
+          <a:lnRef idx="1">
+            <a:schemeClr val="accent2"/>
+          </a:lnRef>
+          <a:fillRef idx="0">
+            <a:schemeClr val="accent2"/>
+          </a:fillRef>
+          <a:effectRef idx="0">
+            <a:schemeClr val="accent2"/>
+          </a:effectRef>
+          <a:fontRef idx="minor">
+            <a:schemeClr val="tx1"/>
+          </a:fontRef>
+        </p:style>
+      </p:cxnSp>
+      <p:cxnSp>
+        <p:nvCxnSpPr>
+          <p:cNvPr id="19" name="Straight Connector 18"/>
+          <p:cNvCxnSpPr/>
+          <p:nvPr/>
+        </p:nvCxnSpPr>
+        <p:spPr>
+          <a:xfrm flipV="1">
+            <a:off x="1455966" y="4537817"/>
+            <a:ext cx="3338225" cy="24213"/>
+          </a:xfrm>
+          <a:prstGeom prst="line">
+            <a:avLst/>
+          </a:prstGeom>
+          <a:ln w="31750">
+            <a:solidFill>
+              <a:srgbClr val="FF0000"/>
+            </a:solidFill>
+          </a:ln>
+        </p:spPr>
+        <p:style>
+          <a:lnRef idx="1">
+            <a:schemeClr val="accent2"/>
+          </a:lnRef>
+          <a:fillRef idx="0">
+            <a:schemeClr val="accent2"/>
+          </a:fillRef>
+          <a:effectRef idx="0">
+            <a:schemeClr val="accent2"/>
+          </a:effectRef>
+          <a:fontRef idx="minor">
+            <a:schemeClr val="tx1"/>
+          </a:fontRef>
+        </p:style>
+      </p:cxnSp>
     </p:spTree>
     <p:extLst>
       <p:ext uri="{BB962C8B-B14F-4D97-AF65-F5344CB8AC3E}">
@@ -4130,7 +4249,6 @@
               <a:rPr lang="en-US" dirty="0"/>
               <a:t>CWH -- Background</a:t>
             </a:r>
-            <a:endParaRPr lang="en-US" dirty="0"/>
           </a:p>
         </p:txBody>
       </p:sp>
@@ -4158,13 +4276,8 @@
           <a:p>
             <a:r>
               <a:rPr lang="en-US" dirty="0" smtClean="0"/>
-              <a:t>How have humans impacted the density of CWH in aquatic systems</a:t>
-            </a:r>
-            <a:r>
-              <a:rPr lang="en-US" dirty="0" smtClean="0"/>
-              <a:t>?</a:t>
-            </a:r>
-            <a:endParaRPr lang="en-US" dirty="0" smtClean="0"/>
+              <a:t>How have humans impacted the density of CWH in aquatic systems?</a:t>
+            </a:r>
           </a:p>
         </p:txBody>
       </p:sp>
@@ -4338,6 +4451,41 @@
           </p:txBody>
         </p:sp>
       </p:grpSp>
+      <p:cxnSp>
+        <p:nvCxnSpPr>
+          <p:cNvPr id="10" name="Straight Connector 9"/>
+          <p:cNvCxnSpPr/>
+          <p:nvPr/>
+        </p:nvCxnSpPr>
+        <p:spPr>
+          <a:xfrm>
+            <a:off x="1049439" y="2331849"/>
+            <a:ext cx="11651" cy="3034910"/>
+          </a:xfrm>
+          <a:prstGeom prst="line">
+            <a:avLst/>
+          </a:prstGeom>
+          <a:ln w="31750">
+            <a:solidFill>
+              <a:srgbClr val="FF0000"/>
+            </a:solidFill>
+          </a:ln>
+        </p:spPr>
+        <p:style>
+          <a:lnRef idx="1">
+            <a:schemeClr val="accent2"/>
+          </a:lnRef>
+          <a:fillRef idx="0">
+            <a:schemeClr val="accent2"/>
+          </a:fillRef>
+          <a:effectRef idx="0">
+            <a:schemeClr val="accent2"/>
+          </a:effectRef>
+          <a:fontRef idx="minor">
+            <a:schemeClr val="tx1"/>
+          </a:fontRef>
+        </p:style>
+      </p:cxnSp>
     </p:spTree>
     <p:extLst>
       <p:ext uri="{BB962C8B-B14F-4D97-AF65-F5344CB8AC3E}">
@@ -4499,7 +4647,6 @@
               <a:rPr lang="en-US" dirty="0" smtClean="0"/>
               <a:t>What was the primary objective of this research?</a:t>
             </a:r>
-            <a:endParaRPr lang="en-US" dirty="0" smtClean="0"/>
           </a:p>
         </p:txBody>
       </p:sp>
@@ -4527,6 +4674,111 @@
           </a:prstGeom>
         </p:spPr>
       </p:pic>
+      <p:cxnSp>
+        <p:nvCxnSpPr>
+          <p:cNvPr id="5" name="Straight Connector 4"/>
+          <p:cNvCxnSpPr/>
+          <p:nvPr/>
+        </p:nvCxnSpPr>
+        <p:spPr>
+          <a:xfrm>
+            <a:off x="691214" y="2270021"/>
+            <a:ext cx="11651" cy="1076397"/>
+          </a:xfrm>
+          <a:prstGeom prst="line">
+            <a:avLst/>
+          </a:prstGeom>
+          <a:ln w="31750">
+            <a:solidFill>
+              <a:srgbClr val="FF0000"/>
+            </a:solidFill>
+          </a:ln>
+        </p:spPr>
+        <p:style>
+          <a:lnRef idx="1">
+            <a:schemeClr val="accent2"/>
+          </a:lnRef>
+          <a:fillRef idx="0">
+            <a:schemeClr val="accent2"/>
+          </a:fillRef>
+          <a:effectRef idx="0">
+            <a:schemeClr val="accent2"/>
+          </a:effectRef>
+          <a:fontRef idx="minor">
+            <a:schemeClr val="tx1"/>
+          </a:fontRef>
+        </p:style>
+      </p:cxnSp>
+      <p:cxnSp>
+        <p:nvCxnSpPr>
+          <p:cNvPr id="7" name="Straight Connector 6"/>
+          <p:cNvCxnSpPr/>
+          <p:nvPr/>
+        </p:nvCxnSpPr>
+        <p:spPr>
+          <a:xfrm>
+            <a:off x="553055" y="3029175"/>
+            <a:ext cx="26837" cy="1389001"/>
+          </a:xfrm>
+          <a:prstGeom prst="line">
+            <a:avLst/>
+          </a:prstGeom>
+          <a:ln w="31750">
+            <a:solidFill>
+              <a:srgbClr val="FF0000"/>
+            </a:solidFill>
+          </a:ln>
+        </p:spPr>
+        <p:style>
+          <a:lnRef idx="1">
+            <a:schemeClr val="accent2"/>
+          </a:lnRef>
+          <a:fillRef idx="0">
+            <a:schemeClr val="accent2"/>
+          </a:fillRef>
+          <a:effectRef idx="0">
+            <a:schemeClr val="accent2"/>
+          </a:effectRef>
+          <a:fontRef idx="minor">
+            <a:schemeClr val="tx1"/>
+          </a:fontRef>
+        </p:style>
+      </p:cxnSp>
+      <p:cxnSp>
+        <p:nvCxnSpPr>
+          <p:cNvPr id="9" name="Straight Connector 8"/>
+          <p:cNvCxnSpPr/>
+          <p:nvPr/>
+        </p:nvCxnSpPr>
+        <p:spPr>
+          <a:xfrm>
+            <a:off x="696909" y="4155798"/>
+            <a:ext cx="26837" cy="1389001"/>
+          </a:xfrm>
+          <a:prstGeom prst="line">
+            <a:avLst/>
+          </a:prstGeom>
+          <a:ln w="31750">
+            <a:solidFill>
+              <a:srgbClr val="FF0000"/>
+            </a:solidFill>
+          </a:ln>
+        </p:spPr>
+        <p:style>
+          <a:lnRef idx="1">
+            <a:schemeClr val="accent2"/>
+          </a:lnRef>
+          <a:fillRef idx="0">
+            <a:schemeClr val="accent2"/>
+          </a:fillRef>
+          <a:effectRef idx="0">
+            <a:schemeClr val="accent2"/>
+          </a:effectRef>
+          <a:fontRef idx="minor">
+            <a:schemeClr val="tx1"/>
+          </a:fontRef>
+        </p:style>
+      </p:cxnSp>
     </p:spTree>
     <p:extLst>
       <p:ext uri="{BB962C8B-B14F-4D97-AF65-F5344CB8AC3E}">
@@ -4742,7 +4994,6 @@
               <a:rPr lang="en-US" dirty="0" smtClean="0"/>
               <a:t>Cabin density, riparian tree density, riparian tree basal area</a:t>
             </a:r>
-            <a:endParaRPr lang="en-US" dirty="0" smtClean="0"/>
           </a:p>
         </p:txBody>
       </p:sp>

</xml_diff>